<commit_message>
small improvements PPT and creation of PDF
</commit_message>
<xml_diff>
--- a/ProjectPresentation_asadikovic_jlyrer.pptx
+++ b/ProjectPresentation_asadikovic_jlyrer.pptx
@@ -4887,7 +4887,7 @@
           <a:p>
             <a:fld id="{F68ABEA4-9216-4FDF-AAE1-D8632908A8EC}" type="datetimeFigureOut">
               <a:rPr lang="de-CH" smtClean="0"/>
-              <a:t>24.07.2025</a:t>
+              <a:t>25.07.2025</a:t>
             </a:fld>
             <a:endParaRPr lang="de-CH"/>
           </a:p>
@@ -5064,7 +5064,7 @@
           <a:p>
             <a:fld id="{4B78A90D-FE7E-41AF-B03D-808D82937CB9}" type="datetimeFigureOut">
               <a:rPr lang="de-CH" smtClean="0"/>
-              <a:t>24.07.2025</a:t>
+              <a:t>25.07.2025</a:t>
             </a:fld>
             <a:endParaRPr lang="de-CH"/>
           </a:p>
@@ -5792,7 +5792,7 @@
           <a:p>
             <a:fld id="{C47C2547-0B26-4181-9958-0F74634B97A1}" type="datetime1">
               <a:rPr lang="de-CH" noProof="0" smtClean="0"/>
-              <a:t>24.07.2025</a:t>
+              <a:t>25.07.2025</a:t>
             </a:fld>
             <a:endParaRPr lang="de-CH" noProof="0"/>
           </a:p>
@@ -5987,7 +5987,7 @@
           <a:p>
             <a:fld id="{4A533879-9C0F-4F94-919F-30B833E8871A}" type="datetime1">
               <a:rPr lang="de-CH" noProof="0" smtClean="0"/>
-              <a:t>24.07.2025</a:t>
+              <a:t>25.07.2025</a:t>
             </a:fld>
             <a:endParaRPr lang="de-CH" noProof="0"/>
           </a:p>
@@ -6274,7 +6274,7 @@
           <a:p>
             <a:fld id="{68EF82BE-DF56-4719-B180-C3B0D509F71F}" type="datetime1">
               <a:rPr lang="de-CH" noProof="0" smtClean="0"/>
-              <a:t>24.07.2025</a:t>
+              <a:t>25.07.2025</a:t>
             </a:fld>
             <a:endParaRPr lang="de-CH" noProof="0"/>
           </a:p>
@@ -6572,7 +6572,7 @@
           <a:p>
             <a:fld id="{3E1B9425-7348-43E2-B0E9-6A2A48F5FA8A}" type="datetime1">
               <a:rPr lang="de-CH" noProof="0" smtClean="0"/>
-              <a:t>24.07.2025</a:t>
+              <a:t>25.07.2025</a:t>
             </a:fld>
             <a:endParaRPr lang="de-CH" noProof="0"/>
           </a:p>
@@ -6972,7 +6972,7 @@
           <a:p>
             <a:fld id="{0F7782B2-018B-4FD3-AD95-2F64EDE0E9D6}" type="datetime1">
               <a:rPr lang="de-CH" noProof="0" smtClean="0"/>
-              <a:t>24.07.2025</a:t>
+              <a:t>25.07.2025</a:t>
             </a:fld>
             <a:endParaRPr lang="de-CH" noProof="0"/>
           </a:p>
@@ -7340,7 +7340,7 @@
           <a:p>
             <a:fld id="{D0A0FED0-443D-411A-B8E4-0668A8890EE3}" type="datetime1">
               <a:rPr lang="de-CH" noProof="0" smtClean="0"/>
-              <a:t>24.07.2025</a:t>
+              <a:t>25.07.2025</a:t>
             </a:fld>
             <a:endParaRPr lang="de-CH" noProof="0"/>
           </a:p>
@@ -9369,7 +9369,7 @@
           <a:p>
             <a:fld id="{1332D50A-E6CC-4D88-8908-F2129032F4C7}" type="datetime1">
               <a:rPr lang="de-CH" noProof="0" smtClean="0"/>
-              <a:t>24.07.2025</a:t>
+              <a:t>25.07.2025</a:t>
             </a:fld>
             <a:endParaRPr lang="de-CH" noProof="0"/>
           </a:p>
@@ -9612,7 +9612,7 @@
           <a:p>
             <a:fld id="{11B96697-4585-4368-989A-16003D150648}" type="datetime1">
               <a:rPr lang="de-CH" noProof="0" smtClean="0"/>
-              <a:t>24.07.2025</a:t>
+              <a:t>25.07.2025</a:t>
             </a:fld>
             <a:endParaRPr lang="de-CH" noProof="0"/>
           </a:p>
@@ -9860,7 +9860,7 @@
           <a:p>
             <a:fld id="{3A01E762-278A-4155-9BEB-7C2CB2386E92}" type="datetime1">
               <a:rPr lang="de-CH" noProof="0" smtClean="0"/>
-              <a:t>24.07.2025</a:t>
+              <a:t>25.07.2025</a:t>
             </a:fld>
             <a:endParaRPr lang="de-CH" noProof="0"/>
           </a:p>
@@ -10136,7 +10136,7 @@
           <a:p>
             <a:fld id="{6C4EAFE7-317E-4912-B75C-DD6945F82242}" type="datetime1">
               <a:rPr lang="de-CH" noProof="0" smtClean="0"/>
-              <a:t>24.07.2025</a:t>
+              <a:t>25.07.2025</a:t>
             </a:fld>
             <a:endParaRPr lang="de-CH" noProof="0"/>
           </a:p>
@@ -12067,7 +12067,7 @@
           <a:p>
             <a:fld id="{4A358CF3-A22A-46C1-A4E5-5810212466EF}" type="datetime1">
               <a:rPr lang="de-CH" noProof="0" smtClean="0"/>
-              <a:t>24.07.2025</a:t>
+              <a:t>25.07.2025</a:t>
             </a:fld>
             <a:endParaRPr lang="de-CH" noProof="0"/>
           </a:p>
@@ -12757,7 +12757,7 @@
             <p:ph type="tbl" sz="quarter" idx="13"/>
             <p:extLst>
               <p:ext uri="{D42A27DB-BD31-4B8C-83A1-F6EECF244321}">
-                <p14:modId xmlns:p14="http://schemas.microsoft.com/office/powerpoint/2010/main" val="3898728937"/>
+                <p14:modId xmlns:p14="http://schemas.microsoft.com/office/powerpoint/2010/main" val="792910554"/>
               </p:ext>
             </p:extLst>
           </p:nvPr>
@@ -13207,7 +13207,7 @@
                     <a:p>
                       <a:pPr algn="ctr" fontAlgn="b"/>
                       <a:r>
-                        <a:rPr lang="de-CH" sz="1100" b="0" i="0" u="none" strike="noStrike" dirty="0">
+                        <a:rPr lang="de-CH" sz="1400" b="0" i="0" u="none" strike="noStrike" dirty="0">
                           <a:solidFill>
                             <a:srgbClr val="000000"/>
                           </a:solidFill>
@@ -13220,7 +13220,7 @@
                     <a:p>
                       <a:pPr algn="ctr" fontAlgn="b"/>
                       <a:r>
-                        <a:rPr lang="de-CH" sz="1100" b="0" i="0" u="none" strike="noStrike" dirty="0">
+                        <a:rPr lang="de-CH" sz="1400" b="0" i="0" u="none" strike="noStrike" dirty="0">
                           <a:solidFill>
                             <a:srgbClr val="000000"/>
                           </a:solidFill>
@@ -13549,7 +13549,7 @@
                     <a:p>
                       <a:pPr algn="ctr" fontAlgn="b"/>
                       <a:r>
-                        <a:rPr lang="de-CH" sz="1100" b="0" i="0" u="none" strike="noStrike" dirty="0">
+                        <a:rPr lang="de-CH" sz="1400" b="0" i="0" u="none" strike="noStrike" dirty="0">
                           <a:solidFill>
                             <a:srgbClr val="000000"/>
                           </a:solidFill>
@@ -13562,7 +13562,7 @@
                     <a:p>
                       <a:pPr algn="ctr" fontAlgn="b"/>
                       <a:r>
-                        <a:rPr lang="de-CH" sz="1100" b="0" i="0" u="none" strike="noStrike" dirty="0">
+                        <a:rPr lang="de-CH" sz="1400" b="0" i="0" u="none" strike="noStrike" dirty="0">
                           <a:solidFill>
                             <a:srgbClr val="000000"/>
                           </a:solidFill>
@@ -13891,7 +13891,7 @@
                     <a:p>
                       <a:pPr algn="ctr" fontAlgn="b"/>
                       <a:r>
-                        <a:rPr lang="de-CH" sz="1100" b="0" i="0" u="none" strike="noStrike" dirty="0">
+                        <a:rPr lang="de-CH" sz="1400" b="0" i="0" u="none" strike="noStrike" dirty="0">
                           <a:solidFill>
                             <a:srgbClr val="000000"/>
                           </a:solidFill>
@@ -13904,7 +13904,7 @@
                     <a:p>
                       <a:pPr algn="ctr" fontAlgn="b"/>
                       <a:r>
-                        <a:rPr lang="de-CH" sz="1100" b="0" i="0" u="none" strike="noStrike" dirty="0">
+                        <a:rPr lang="de-CH" sz="1400" b="0" i="0" u="none" strike="noStrike" dirty="0">
                           <a:solidFill>
                             <a:srgbClr val="000000"/>
                           </a:solidFill>
@@ -15403,7 +15403,7 @@
           <a:p>
             <a:fld id="{7260A9D5-8325-4620-96F6-FB312AC6FB66}" type="datetime1">
               <a:rPr lang="en-GB" noProof="0" smtClean="0"/>
-              <a:t>24/07/2025</a:t>
+              <a:t>25/07/2025</a:t>
             </a:fld>
             <a:endParaRPr lang="en-GB" noProof="0" dirty="0"/>
           </a:p>
@@ -15547,7 +15547,7 @@
             <p:ph type="tbl" sz="quarter" idx="13"/>
             <p:extLst>
               <p:ext uri="{D42A27DB-BD31-4B8C-83A1-F6EECF244321}">
-                <p14:modId xmlns:p14="http://schemas.microsoft.com/office/powerpoint/2010/main" val="1755086574"/>
+                <p14:modId xmlns:p14="http://schemas.microsoft.com/office/powerpoint/2010/main" val="1517503830"/>
               </p:ext>
             </p:extLst>
           </p:nvPr>
@@ -15997,7 +15997,7 @@
                     <a:p>
                       <a:pPr algn="ctr" fontAlgn="b"/>
                       <a:r>
-                        <a:rPr lang="de-CH" sz="1100" b="0" i="0" u="none" strike="noStrike" dirty="0">
+                        <a:rPr lang="de-CH" sz="1400" b="0" i="0" u="none" strike="noStrike" dirty="0">
                           <a:solidFill>
                             <a:srgbClr val="000000"/>
                           </a:solidFill>
@@ -16326,7 +16326,7 @@
                     <a:p>
                       <a:pPr algn="ctr" fontAlgn="b"/>
                       <a:r>
-                        <a:rPr lang="de-CH" sz="1100" b="0" i="0" u="none" strike="noStrike" dirty="0">
+                        <a:rPr lang="de-CH" sz="1400" b="0" i="0" u="none" strike="noStrike" dirty="0">
                           <a:solidFill>
                             <a:srgbClr val="000000"/>
                           </a:solidFill>
@@ -16655,7 +16655,7 @@
                     <a:p>
                       <a:pPr algn="ctr" fontAlgn="b"/>
                       <a:r>
-                        <a:rPr lang="de-CH" sz="1100" b="0" i="0" u="none" strike="noStrike" dirty="0">
+                        <a:rPr lang="de-CH" sz="1400" b="0" i="0" u="none" strike="noStrike" dirty="0">
                           <a:solidFill>
                             <a:srgbClr val="000000"/>
                           </a:solidFill>
@@ -18154,7 +18154,7 @@
           <a:p>
             <a:fld id="{7260A9D5-8325-4620-96F6-FB312AC6FB66}" type="datetime1">
               <a:rPr lang="en-GB" noProof="0" smtClean="0"/>
-              <a:t>24/07/2025</a:t>
+              <a:t>25/07/2025</a:t>
             </a:fld>
             <a:endParaRPr lang="en-GB" noProof="0" dirty="0"/>
           </a:p>
@@ -18306,7 +18306,7 @@
             <p:ph type="tbl" sz="quarter" idx="13"/>
             <p:extLst>
               <p:ext uri="{D42A27DB-BD31-4B8C-83A1-F6EECF244321}">
-                <p14:modId xmlns:p14="http://schemas.microsoft.com/office/powerpoint/2010/main" val="3879334177"/>
+                <p14:modId xmlns:p14="http://schemas.microsoft.com/office/powerpoint/2010/main" val="3805140450"/>
               </p:ext>
             </p:extLst>
           </p:nvPr>
@@ -18756,7 +18756,7 @@
                     <a:p>
                       <a:pPr algn="ctr" fontAlgn="b"/>
                       <a:r>
-                        <a:rPr lang="de-CH" sz="1100" b="0" i="0" u="none" strike="noStrike" dirty="0">
+                        <a:rPr lang="de-CH" sz="1400" b="0" i="0" u="none" strike="noStrike" dirty="0">
                           <a:solidFill>
                             <a:srgbClr val="000000"/>
                           </a:solidFill>
@@ -19085,7 +19085,7 @@
                     <a:p>
                       <a:pPr algn="ctr" fontAlgn="b"/>
                       <a:r>
-                        <a:rPr lang="de-CH" sz="1100" b="0" i="0" u="none" strike="noStrike" dirty="0">
+                        <a:rPr lang="de-CH" sz="1400" b="0" i="0" u="none" strike="noStrike" dirty="0">
                           <a:solidFill>
                             <a:srgbClr val="000000"/>
                           </a:solidFill>
@@ -19414,7 +19414,7 @@
                     <a:p>
                       <a:pPr algn="ctr" fontAlgn="b"/>
                       <a:r>
-                        <a:rPr lang="de-CH" sz="1100" b="0" i="0" u="none" strike="noStrike" dirty="0">
+                        <a:rPr lang="de-CH" sz="1400" b="0" i="0" u="none" strike="noStrike" dirty="0">
                           <a:solidFill>
                             <a:srgbClr val="000000"/>
                           </a:solidFill>
@@ -20913,7 +20913,7 @@
           <a:p>
             <a:fld id="{7260A9D5-8325-4620-96F6-FB312AC6FB66}" type="datetime1">
               <a:rPr lang="en-GB" noProof="0" smtClean="0"/>
-              <a:t>24/07/2025</a:t>
+              <a:t>25/07/2025</a:t>
             </a:fld>
             <a:endParaRPr lang="en-GB" noProof="0" dirty="0"/>
           </a:p>
@@ -21007,7 +21007,7 @@
           <a:p>
             <a:r>
               <a:rPr lang="en-GB" dirty="0"/>
-              <a:t>Comparing Results</a:t>
+              <a:t>Comparing Results I</a:t>
             </a:r>
             <a:endParaRPr lang="en-GB" noProof="0" dirty="0"/>
           </a:p>
@@ -21239,7 +21239,7 @@
           <a:p>
             <a:fld id="{3883C902-160B-4538-99A8-1486892643D4}" type="datetime1">
               <a:rPr lang="en-GB" noProof="0" smtClean="0"/>
-              <a:t>24/07/2025</a:t>
+              <a:t>25/07/2025</a:t>
             </a:fld>
             <a:endParaRPr lang="en-GB" noProof="0" dirty="0"/>
           </a:p>
@@ -21470,7 +21470,7 @@
           <a:p>
             <a:fld id="{3883C902-160B-4538-99A8-1486892643D4}" type="datetime1">
               <a:rPr lang="en-GB" noProof="0" smtClean="0"/>
-              <a:t>24/07/2025</a:t>
+              <a:t>25/07/2025</a:t>
             </a:fld>
             <a:endParaRPr lang="en-GB" noProof="0" dirty="0"/>
           </a:p>
@@ -21695,7 +21695,7 @@
           <a:p>
             <a:fld id="{C32F3C7F-0C5F-4A18-A13A-CAEFDEB56FA0}" type="datetime1">
               <a:rPr lang="en-GB" noProof="0" smtClean="0"/>
-              <a:t>24/07/2025</a:t>
+              <a:t>25/07/2025</a:t>
             </a:fld>
             <a:endParaRPr lang="en-GB" noProof="0" dirty="0"/>
           </a:p>
@@ -21878,8 +21878,12 @@
           <a:lstStyle/>
           <a:p>
             <a:r>
+              <a:rPr lang="en-GB" b="1" dirty="0"/>
+              <a:t>We improve the success rate </a:t>
+            </a:r>
+            <a:r>
               <a:rPr lang="en-GB" dirty="0"/>
-              <a:t>We improve the success rate from ~11% to &gt;20% even with depth 1 of DrawAnalyzer practically doubling it at the cost of factor 90 in terms of calculation time</a:t>
+              <a:t>from ~11% to &gt;20% even with depth 1 of DrawAnalyzer practically doubling it at the cost of factor 90 in terms of calculation time</a:t>
             </a:r>
           </a:p>
           <a:p>
@@ -21896,14 +21900,22 @@
           </a:p>
           <a:p>
             <a:r>
+              <a:rPr lang="en-GB" b="1" dirty="0"/>
+              <a:t>Shanten gets improved earlier </a:t>
+            </a:r>
+            <a:r>
               <a:rPr lang="en-GB" dirty="0"/>
-              <a:t>Shanten gets improved earlier in the game with both iterations of DrawAnalyzer, which shows that the algorithm constantly performs goal-oriented and makes good decisions throughout the game.</a:t>
+              <a:t>in the game with both iterations of DrawAnalyzer, which shows that the algorithm constantly performs goal-oriented and makes good decisions throughout the game.</a:t>
             </a:r>
           </a:p>
           <a:p>
             <a:r>
+              <a:rPr lang="en-GB" b="1" dirty="0"/>
+              <a:t>DrawAnalyzer with depth 1 seems to be the current best solution </a:t>
+            </a:r>
+            <a:r>
               <a:rPr lang="en-GB" dirty="0"/>
-              <a:t>DrawAnalyzer with depth 1 seems to be the current best solution in terms of usability, because the DrawAnalyzer with depth 2 takes to long to calculate.</a:t>
+              <a:t>in terms of usability, because the DrawAnalyzer with depth 2 takes to long to calculate.</a:t>
             </a:r>
           </a:p>
           <a:p>
@@ -21943,7 +21955,7 @@
           <a:p>
             <a:fld id="{D5CE5686-0170-47AF-9B8A-7DF387E652FA}" type="datetime1">
               <a:rPr lang="en-GB" noProof="0" smtClean="0"/>
-              <a:t>24/07/2025</a:t>
+              <a:t>25/07/2025</a:t>
             </a:fld>
             <a:endParaRPr lang="en-GB" noProof="0" dirty="0"/>
           </a:p>
@@ -22069,7 +22081,7 @@
             </a:pPr>
             <a:r>
               <a:rPr lang="en-GB" dirty="0"/>
-              <a:t>GitHub</a:t>
+              <a:t>GitHub Repository</a:t>
             </a:r>
             <a:endParaRPr lang="en-GB" dirty="0">
               <a:hlinkClick r:id="rId2"/>
@@ -22096,7 +22108,7 @@
             </a:pPr>
             <a:r>
               <a:rPr lang="en-GB" dirty="0"/>
-              <a:t>Image1</a:t>
+              <a:t>Image1 / Game Explanation</a:t>
             </a:r>
           </a:p>
           <a:p>
@@ -22139,7 +22151,7 @@
           <a:p>
             <a:fld id="{D5CE5686-0170-47AF-9B8A-7DF387E652FA}" type="datetime1">
               <a:rPr lang="en-GB" noProof="0" smtClean="0"/>
-              <a:t>24/07/2025</a:t>
+              <a:t>25/07/2025</a:t>
             </a:fld>
             <a:endParaRPr lang="en-GB" noProof="0" dirty="0"/>
           </a:p>
@@ -22281,13 +22293,29 @@
           <a:p>
             <a:r>
               <a:rPr lang="en-GB" dirty="0"/>
-              <a:t>For the sake of simplicity, we will reduce the game to the following rulesets: At the start of the game, we put 14 Tiles aside and the 4 players draw 13 Tiles each. On a players turn, that player draws a Tile and then discards one if he does not have a winning hand yet. A winning hand consists of 4 groups of three Tiles (sequences of the same colour or identical Tiles) and a pair of identical Tiles. </a:t>
+              <a:t>For the sake of simplicity, </a:t>
+            </a:r>
+            <a:r>
+              <a:rPr lang="en-GB" i="1" dirty="0"/>
+              <a:t>we will reduce the game to the following rulesets</a:t>
+            </a:r>
+            <a:r>
+              <a:rPr lang="en-GB" dirty="0"/>
+              <a:t>: At the start of the game, we put 14 Tiles aside and the 4 players draw 13 Tiles each. On a players turn, that player draws a Tile and then discards one if he does not have a winning hand yet. A winning hand consists of 4 groups of three Tiles (sequences of the same colour or identical Tiles) and a pair of identical Tiles. </a:t>
             </a:r>
           </a:p>
           <a:p>
             <a:r>
               <a:rPr lang="en-GB" dirty="0"/>
-              <a:t>Our goal: Given a random Hand consisting of 14 Tiles which all have a colour and a value, find the best Tile to discard and reach a winning hand. </a:t>
+              <a:t>Our </a:t>
+            </a:r>
+            <a:r>
+              <a:rPr lang="en-GB" b="1" dirty="0"/>
+              <a:t>goal</a:t>
+            </a:r>
+            <a:r>
+              <a:rPr lang="en-GB" dirty="0"/>
+              <a:t>: Given a random Hand consisting of 14 Tiles which all have a colour and a value, find the best Tile to discard and reach a winning hand. </a:t>
             </a:r>
           </a:p>
           <a:p>
@@ -22304,8 +22332,12 @@
           </a:p>
           <a:p>
             <a:r>
+              <a:rPr lang="en-GB" i="1" dirty="0"/>
+              <a:t>Our Optimization only covers a part of the real Japanese Mahjong</a:t>
+            </a:r>
+            <a:r>
               <a:rPr lang="en-GB" dirty="0"/>
-              <a:t>Our Optimization only covers a part of the real Japanese Mahjong, We do not consider things like </a:t>
+              <a:t>, We do not consider things like </a:t>
             </a:r>
             <a:r>
               <a:rPr lang="en-GB" dirty="0" err="1"/>
@@ -22347,7 +22379,7 @@
           <a:p>
             <a:fld id="{D5CE5686-0170-47AF-9B8A-7DF387E652FA}" type="datetime1">
               <a:rPr lang="en-GB" noProof="0" smtClean="0"/>
-              <a:t>24/07/2025</a:t>
+              <a:t>25/07/2025</a:t>
             </a:fld>
             <a:endParaRPr lang="en-GB" noProof="0" dirty="0"/>
           </a:p>
@@ -22928,7 +22960,7 @@
           <a:p>
             <a:fld id="{D5CE5686-0170-47AF-9B8A-7DF387E652FA}" type="datetime1">
               <a:rPr lang="en-GB" noProof="0" smtClean="0"/>
-              <a:t>24/07/2025</a:t>
+              <a:t>25/07/2025</a:t>
             </a:fld>
             <a:endParaRPr lang="en-GB" noProof="0" dirty="0"/>
           </a:p>
@@ -23028,98 +23060,411 @@
           </a:p>
         </p:txBody>
       </p:sp>
-      <p:sp>
-        <p:nvSpPr>
-          <p:cNvPr id="3" name="Inhaltsplatzhalter 2">
-            <a:extLst>
-              <a:ext uri="{FF2B5EF4-FFF2-40B4-BE49-F238E27FC236}">
-                <a16:creationId xmlns:a16="http://schemas.microsoft.com/office/drawing/2014/main" id="{02BED1EA-6888-20A7-1A8D-E0803B84EC55}"/>
-              </a:ext>
-            </a:extLst>
-          </p:cNvPr>
-          <p:cNvSpPr>
-            <a:spLocks noGrp="1"/>
-          </p:cNvSpPr>
-          <p:nvPr>
-            <p:ph idx="1"/>
-          </p:nvPr>
-        </p:nvSpPr>
-        <p:spPr/>
-        <p:txBody>
-          <a:bodyPr/>
-          <a:lstStyle/>
-          <a:p>
-            <a:pPr marL="0" indent="0">
-              <a:buNone/>
-            </a:pPr>
-            <a:r>
-              <a:rPr lang="en-GB" b="1" dirty="0"/>
-              <a:t>What our naïve Algorithm does: </a:t>
-            </a:r>
-          </a:p>
-          <a:p>
-            <a:pPr lvl="1"/>
-            <a:r>
-              <a:rPr lang="en-GB" dirty="0"/>
-              <a:t>Check if there are still Tiles on the Stack; if not end the game</a:t>
-            </a:r>
-          </a:p>
-          <a:p>
-            <a:pPr lvl="1"/>
-            <a:r>
-              <a:rPr lang="en-GB" dirty="0"/>
-              <a:t>Draw a Tile and calculate </a:t>
-            </a:r>
-            <a:r>
-              <a:rPr lang="en-GB" dirty="0" err="1"/>
-              <a:t>Shanten</a:t>
-            </a:r>
-            <a:r>
-              <a:rPr lang="en-GB" dirty="0"/>
-              <a:t> (edit distance for a ready hand) for the current hand</a:t>
-            </a:r>
-          </a:p>
-          <a:p>
-            <a:pPr lvl="1"/>
-            <a:r>
-              <a:rPr lang="en-GB" dirty="0"/>
-              <a:t>If Shanten is -1 (a winning hand) we win and end the game</a:t>
-            </a:r>
-          </a:p>
-          <a:p>
-            <a:pPr lvl="1"/>
-            <a:r>
-              <a:rPr lang="en-GB" dirty="0"/>
-              <a:t>While calculating Shanten we log which Tiles would not increase the </a:t>
-            </a:r>
-            <a:r>
-              <a:rPr lang="en-GB" dirty="0" err="1"/>
-              <a:t>Shanten</a:t>
-            </a:r>
-            <a:r>
-              <a:rPr lang="en-GB" dirty="0"/>
-              <a:t> if discarded</a:t>
-            </a:r>
-          </a:p>
-          <a:p>
-            <a:pPr lvl="1"/>
-            <a:r>
-              <a:rPr lang="en-GB" dirty="0"/>
-              <a:t>We chose one of those Tiles at random and discard it</a:t>
-            </a:r>
-          </a:p>
-          <a:p>
-            <a:pPr lvl="1"/>
-            <a:endParaRPr lang="en-GB" dirty="0"/>
-          </a:p>
-          <a:p>
-            <a:endParaRPr lang="en-GB" dirty="0"/>
-          </a:p>
-          <a:p>
-            <a:endParaRPr lang="en-GB" noProof="0" dirty="0"/>
-          </a:p>
-        </p:txBody>
-      </p:sp>
+      <mc:AlternateContent xmlns:mc="http://schemas.openxmlformats.org/markup-compatibility/2006">
+        <mc:Choice xmlns:a14="http://schemas.microsoft.com/office/drawing/2010/main" Requires="a14">
+          <p:sp>
+            <p:nvSpPr>
+              <p:cNvPr id="3" name="Inhaltsplatzhalter 2">
+                <a:extLst>
+                  <a:ext uri="{FF2B5EF4-FFF2-40B4-BE49-F238E27FC236}">
+                    <a16:creationId xmlns:a16="http://schemas.microsoft.com/office/drawing/2014/main" id="{02BED1EA-6888-20A7-1A8D-E0803B84EC55}"/>
+                  </a:ext>
+                </a:extLst>
+              </p:cNvPr>
+              <p:cNvSpPr>
+                <a:spLocks noGrp="1"/>
+              </p:cNvSpPr>
+              <p:nvPr>
+                <p:ph idx="1"/>
+              </p:nvPr>
+            </p:nvSpPr>
+            <p:spPr/>
+            <p:txBody>
+              <a:bodyPr/>
+              <a:lstStyle/>
+              <a:p>
+                <a:pPr marL="0" indent="0">
+                  <a:buNone/>
+                </a:pPr>
+                <a:r>
+                  <a:rPr lang="en-GB" b="1" dirty="0"/>
+                  <a:t>What our naïve Algorithm does: </a:t>
+                </a:r>
+              </a:p>
+              <a:p>
+                <a:pPr lvl="1"/>
+                <a:r>
+                  <a:rPr lang="en-GB" dirty="0"/>
+                  <a:t>Check if there are still Tiles in the Stack; if not end the game in a loss</a:t>
+                </a:r>
+              </a:p>
+              <a:p>
+                <a:pPr lvl="1"/>
+                <a:r>
+                  <a:rPr lang="en-GB" dirty="0"/>
+                  <a:t>Draw a Tile from the Stack</a:t>
+                </a:r>
+              </a:p>
+              <a:p>
+                <a:pPr lvl="1"/>
+                <a:r>
+                  <a:rPr lang="en-GB" dirty="0"/>
+                  <a:t>Calculate Shanten for the current Hand </a:t>
+                </a:r>
+                <a14:m>
+                  <m:oMath xmlns:m="http://schemas.openxmlformats.org/officeDocument/2006/math">
+                    <m:r>
+                      <a:rPr lang="de-CH" b="0" i="1" smtClean="0">
+                        <a:latin typeface="Cambria Math" panose="02040503050406030204" pitchFamily="18" charset="0"/>
+                      </a:rPr>
+                      <m:t>𝐻</m:t>
+                    </m:r>
+                  </m:oMath>
+                </a14:m>
+                <a:endParaRPr lang="en-GB" dirty="0"/>
+              </a:p>
+              <a:p>
+                <a:pPr lvl="1"/>
+                <a:r>
+                  <a:rPr lang="en-GB" dirty="0"/>
+                  <a:t>If Shanten = -1 (a winning Hand); end the game as a win</a:t>
+                </a:r>
+              </a:p>
+              <a:p>
+                <a:pPr lvl="1"/>
+                <a:r>
+                  <a:rPr lang="en-GB" dirty="0"/>
+                  <a:t>For all Tiles in our Hand </a:t>
+                </a:r>
+                <a14:m>
+                  <m:oMath xmlns:m="http://schemas.openxmlformats.org/officeDocument/2006/math">
+                    <m:r>
+                      <m:rPr>
+                        <m:sty m:val="p"/>
+                      </m:rPr>
+                      <a:rPr lang="de-CH">
+                        <a:latin typeface="Cambria Math" panose="02040503050406030204" pitchFamily="18" charset="0"/>
+                      </a:rPr>
+                      <m:t>H</m:t>
+                    </m:r>
+                    <m:r>
+                      <a:rPr lang="de-CH" b="0" i="0" smtClean="0">
+                        <a:latin typeface="Cambria Math" panose="02040503050406030204" pitchFamily="18" charset="0"/>
+                      </a:rPr>
+                      <m:t> </m:t>
+                    </m:r>
+                    <m:r>
+                      <a:rPr lang="de-CH" b="0" i="1" smtClean="0">
+                        <a:latin typeface="Cambria Math" panose="02040503050406030204" pitchFamily="18" charset="0"/>
+                      </a:rPr>
+                      <m:t>=</m:t>
+                    </m:r>
+                    <m:d>
+                      <m:dPr>
+                        <m:begChr m:val="{"/>
+                        <m:endChr m:val="}"/>
+                        <m:ctrlPr>
+                          <a:rPr lang="de-CH" b="0" i="1" smtClean="0">
+                            <a:latin typeface="Cambria Math" panose="02040503050406030204" pitchFamily="18" charset="0"/>
+                            <a:ea typeface="Cambria Math" panose="02040503050406030204" pitchFamily="18" charset="0"/>
+                          </a:rPr>
+                        </m:ctrlPr>
+                      </m:dPr>
+                      <m:e>
+                        <m:sSub>
+                          <m:sSubPr>
+                            <m:ctrlPr>
+                              <a:rPr lang="de-CH" b="0" i="1" smtClean="0">
+                                <a:latin typeface="Cambria Math" panose="02040503050406030204" pitchFamily="18" charset="0"/>
+                                <a:ea typeface="Cambria Math" panose="02040503050406030204" pitchFamily="18" charset="0"/>
+                              </a:rPr>
+                            </m:ctrlPr>
+                          </m:sSubPr>
+                          <m:e>
+                            <m:r>
+                              <a:rPr lang="de-CH" b="0" i="1" smtClean="0">
+                                <a:latin typeface="Cambria Math" panose="02040503050406030204" pitchFamily="18" charset="0"/>
+                                <a:ea typeface="Cambria Math" panose="02040503050406030204" pitchFamily="18" charset="0"/>
+                              </a:rPr>
+                              <m:t>𝑡</m:t>
+                            </m:r>
+                          </m:e>
+                          <m:sub>
+                            <m:r>
+                              <a:rPr lang="de-CH" b="0" i="1" smtClean="0">
+                                <a:latin typeface="Cambria Math" panose="02040503050406030204" pitchFamily="18" charset="0"/>
+                                <a:ea typeface="Cambria Math" panose="02040503050406030204" pitchFamily="18" charset="0"/>
+                              </a:rPr>
+                              <m:t>1</m:t>
+                            </m:r>
+                          </m:sub>
+                        </m:sSub>
+                        <m:r>
+                          <a:rPr lang="de-CH" b="0" i="1" smtClean="0">
+                            <a:latin typeface="Cambria Math" panose="02040503050406030204" pitchFamily="18" charset="0"/>
+                            <a:ea typeface="Cambria Math" panose="02040503050406030204" pitchFamily="18" charset="0"/>
+                          </a:rPr>
+                          <m:t>…</m:t>
+                        </m:r>
+                        <m:sSub>
+                          <m:sSubPr>
+                            <m:ctrlPr>
+                              <a:rPr lang="de-CH" b="0" i="1" smtClean="0">
+                                <a:latin typeface="Cambria Math" panose="02040503050406030204" pitchFamily="18" charset="0"/>
+                                <a:ea typeface="Cambria Math" panose="02040503050406030204" pitchFamily="18" charset="0"/>
+                              </a:rPr>
+                            </m:ctrlPr>
+                          </m:sSubPr>
+                          <m:e>
+                            <m:r>
+                              <a:rPr lang="de-CH" b="0" i="1" smtClean="0">
+                                <a:latin typeface="Cambria Math" panose="02040503050406030204" pitchFamily="18" charset="0"/>
+                                <a:ea typeface="Cambria Math" panose="02040503050406030204" pitchFamily="18" charset="0"/>
+                              </a:rPr>
+                              <m:t>𝑡</m:t>
+                            </m:r>
+                          </m:e>
+                          <m:sub>
+                            <m:r>
+                              <a:rPr lang="de-CH" b="0" i="1" smtClean="0">
+                                <a:latin typeface="Cambria Math" panose="02040503050406030204" pitchFamily="18" charset="0"/>
+                                <a:ea typeface="Cambria Math" panose="02040503050406030204" pitchFamily="18" charset="0"/>
+                              </a:rPr>
+                              <m:t>14</m:t>
+                            </m:r>
+                          </m:sub>
+                        </m:sSub>
+                      </m:e>
+                    </m:d>
+                  </m:oMath>
+                </a14:m>
+                <a:r>
+                  <a:rPr lang="en-GB" dirty="0"/>
+                  <a:t> check if they contribute to lowering the current Shanten</a:t>
+                </a:r>
+              </a:p>
+              <a:p>
+                <a:pPr lvl="1"/>
+                <a:r>
+                  <a:rPr lang="en-GB" dirty="0"/>
+                  <a:t>Mark those wo do not lower Shanten in the current hand as </a:t>
+                </a:r>
+                <a14:m>
+                  <m:oMath xmlns:m="http://schemas.openxmlformats.org/officeDocument/2006/math">
+                    <m:r>
+                      <a:rPr lang="de-CH" b="0" i="1" smtClean="0">
+                        <a:latin typeface="Cambria Math" panose="02040503050406030204" pitchFamily="18" charset="0"/>
+                      </a:rPr>
+                      <m:t>𝑝𝑜𝑠𝑠𝑖𝑏𝑙𝑒𝐷𝑖𝑠𝑐𝑎𝑟𝑑</m:t>
+                    </m:r>
+                  </m:oMath>
+                </a14:m>
+                <a:endParaRPr lang="en-GB" dirty="0"/>
+              </a:p>
+              <a:p>
+                <a:pPr lvl="1"/>
+                <a:r>
+                  <a:rPr lang="en-GB" dirty="0"/>
+                  <a:t>From </a:t>
+                </a:r>
+                <a14:m>
+                  <m:oMath xmlns:m="http://schemas.openxmlformats.org/officeDocument/2006/math">
+                    <m:r>
+                      <a:rPr lang="de-CH" b="0" i="1" smtClean="0">
+                        <a:latin typeface="Cambria Math" panose="02040503050406030204" pitchFamily="18" charset="0"/>
+                      </a:rPr>
+                      <m:t>𝑝𝑜𝑠𝑠𝑖𝑏𝑙𝑒𝐷𝑖𝑠𝑐𝑎𝑟𝑑</m:t>
+                    </m:r>
+                    <m:r>
+                      <a:rPr lang="de-CH" b="0" i="1" smtClean="0">
+                        <a:latin typeface="Cambria Math" panose="02040503050406030204" pitchFamily="18" charset="0"/>
+                      </a:rPr>
+                      <m:t> ⊆</m:t>
+                    </m:r>
+                    <m:r>
+                      <a:rPr lang="de-CH" b="0" i="1" smtClean="0">
+                        <a:latin typeface="Cambria Math" panose="02040503050406030204" pitchFamily="18" charset="0"/>
+                        <a:ea typeface="Cambria Math" panose="02040503050406030204" pitchFamily="18" charset="0"/>
+                      </a:rPr>
+                      <m:t>𝐻</m:t>
+                    </m:r>
+                  </m:oMath>
+                </a14:m>
+                <a:r>
+                  <a:rPr lang="en-GB" dirty="0"/>
+                  <a:t> choose one Tile </a:t>
+                </a:r>
+                <a14:m>
+                  <m:oMath xmlns:m="http://schemas.openxmlformats.org/officeDocument/2006/math">
+                    <m:sSub>
+                      <m:sSubPr>
+                        <m:ctrlPr>
+                          <a:rPr lang="en-GB" i="1" smtClean="0">
+                            <a:latin typeface="Cambria Math" panose="02040503050406030204" pitchFamily="18" charset="0"/>
+                          </a:rPr>
+                        </m:ctrlPr>
+                      </m:sSubPr>
+                      <m:e>
+                        <m:r>
+                          <a:rPr lang="de-CH" b="0" i="1" smtClean="0">
+                            <a:latin typeface="Cambria Math" panose="02040503050406030204" pitchFamily="18" charset="0"/>
+                          </a:rPr>
+                          <m:t>𝑡</m:t>
+                        </m:r>
+                      </m:e>
+                      <m:sub>
+                        <m:r>
+                          <a:rPr lang="de-CH" b="0" i="1" smtClean="0">
+                            <a:latin typeface="Cambria Math" panose="02040503050406030204" pitchFamily="18" charset="0"/>
+                          </a:rPr>
+                          <m:t>𝑥</m:t>
+                        </m:r>
+                      </m:sub>
+                    </m:sSub>
+                  </m:oMath>
+                </a14:m>
+                <a:r>
+                  <a:rPr lang="en-GB" dirty="0"/>
+                  <a:t> at random and discard it</a:t>
+                </a:r>
+              </a:p>
+              <a:p>
+                <a:pPr lvl="1"/>
+                <a:r>
+                  <a:rPr lang="en-GB" dirty="0"/>
+                  <a:t>We end our turn</a:t>
+                </a:r>
+              </a:p>
+              <a:p>
+                <a:endParaRPr lang="en-GB" dirty="0"/>
+              </a:p>
+              <a:p>
+                <a:pPr marL="0" indent="0">
+                  <a:buNone/>
+                </a:pPr>
+                <a:r>
+                  <a:rPr lang="en-GB" noProof="0" dirty="0"/>
+                  <a:t>This is a </a:t>
+                </a:r>
+                <a:r>
+                  <a:rPr lang="en-GB" b="1" noProof="0" dirty="0"/>
+                  <a:t>greedy</a:t>
+                </a:r>
+                <a:r>
+                  <a:rPr lang="en-GB" noProof="0" dirty="0"/>
+                  <a:t> algorithm that</a:t>
+                </a:r>
+                <a:r>
+                  <a:rPr lang="en-GB" dirty="0"/>
+                  <a:t> uses the knowledge of whether a tile is currently part of Shanten or not to find a discard that for sure does not worsen ones Hand </a:t>
+                </a:r>
+                <a14:m>
+                  <m:oMath xmlns:m="http://schemas.openxmlformats.org/officeDocument/2006/math">
+                    <m:r>
+                      <a:rPr lang="de-CH" b="0" i="1" smtClean="0">
+                        <a:latin typeface="Cambria Math" panose="02040503050406030204" pitchFamily="18" charset="0"/>
+                      </a:rPr>
+                      <m:t>𝐻</m:t>
+                    </m:r>
+                  </m:oMath>
+                </a14:m>
+                <a:r>
+                  <a:rPr lang="en-GB" noProof="0" dirty="0"/>
+                  <a:t>. It runs in </a:t>
+                </a:r>
+                <a14:m>
+                  <m:oMath xmlns:m="http://schemas.openxmlformats.org/officeDocument/2006/math">
+                    <m:r>
+                      <a:rPr lang="de-CH" b="0" i="1" noProof="0" smtClean="0">
+                        <a:latin typeface="Cambria Math" panose="02040503050406030204" pitchFamily="18" charset="0"/>
+                      </a:rPr>
+                      <m:t>𝑂</m:t>
+                    </m:r>
+                    <m:d>
+                      <m:dPr>
+                        <m:ctrlPr>
+                          <a:rPr lang="de-CH" b="0" i="1" noProof="0" smtClean="0">
+                            <a:latin typeface="Cambria Math" panose="02040503050406030204" pitchFamily="18" charset="0"/>
+                          </a:rPr>
+                        </m:ctrlPr>
+                      </m:dPr>
+                      <m:e>
+                        <m:r>
+                          <a:rPr lang="de-CH" b="0" i="1" noProof="0" smtClean="0">
+                            <a:latin typeface="Cambria Math" panose="02040503050406030204" pitchFamily="18" charset="0"/>
+                          </a:rPr>
+                          <m:t>14</m:t>
+                        </m:r>
+                      </m:e>
+                    </m:d>
+                    <m:r>
+                      <a:rPr lang="de-CH" b="0" i="1" noProof="0" smtClean="0">
+                        <a:latin typeface="Cambria Math" panose="02040503050406030204" pitchFamily="18" charset="0"/>
+                        <a:ea typeface="Cambria Math" panose="02040503050406030204" pitchFamily="18" charset="0"/>
+                      </a:rPr>
+                      <m:t>≤</m:t>
+                    </m:r>
+                    <m:r>
+                      <a:rPr lang="de-CH" b="0" i="1" noProof="0" smtClean="0">
+                        <a:latin typeface="Cambria Math" panose="02040503050406030204" pitchFamily="18" charset="0"/>
+                        <a:ea typeface="Cambria Math" panose="02040503050406030204" pitchFamily="18" charset="0"/>
+                      </a:rPr>
+                      <m:t>𝑂</m:t>
+                    </m:r>
+                    <m:r>
+                      <a:rPr lang="de-CH" b="0" i="1" noProof="0" smtClean="0">
+                        <a:latin typeface="Cambria Math" panose="02040503050406030204" pitchFamily="18" charset="0"/>
+                        <a:ea typeface="Cambria Math" panose="02040503050406030204" pitchFamily="18" charset="0"/>
+                      </a:rPr>
+                      <m:t>(1)</m:t>
+                    </m:r>
+                  </m:oMath>
+                </a14:m>
+                <a:endParaRPr lang="en-GB" noProof="0" dirty="0"/>
+              </a:p>
+            </p:txBody>
+          </p:sp>
+        </mc:Choice>
+        <mc:Fallback>
+          <p:sp>
+            <p:nvSpPr>
+              <p:cNvPr id="3" name="Inhaltsplatzhalter 2">
+                <a:extLst>
+                  <a:ext uri="{FF2B5EF4-FFF2-40B4-BE49-F238E27FC236}">
+                    <a16:creationId xmlns:a16="http://schemas.microsoft.com/office/drawing/2014/main" id="{02BED1EA-6888-20A7-1A8D-E0803B84EC55}"/>
+                  </a:ext>
+                </a:extLst>
+              </p:cNvPr>
+              <p:cNvSpPr>
+                <a:spLocks noGrp="1" noRot="1" noChangeAspect="1" noMove="1" noResize="1" noEditPoints="1" noAdjustHandles="1" noChangeArrowheads="1" noChangeShapeType="1" noTextEdit="1"/>
+              </p:cNvSpPr>
+              <p:nvPr>
+                <p:ph idx="1"/>
+              </p:nvPr>
+            </p:nvSpPr>
+            <p:spPr>
+              <a:blipFill>
+                <a:blip r:embed="rId2"/>
+                <a:stretch>
+                  <a:fillRect l="-1307" t="-1695" r="-455"/>
+                </a:stretch>
+              </a:blipFill>
+            </p:spPr>
+            <p:txBody>
+              <a:bodyPr/>
+              <a:lstStyle/>
+              <a:p>
+                <a:r>
+                  <a:rPr lang="de-CH">
+                    <a:noFill/>
+                  </a:rPr>
+                  <a:t> </a:t>
+                </a:r>
+              </a:p>
+            </p:txBody>
+          </p:sp>
+        </mc:Fallback>
+      </mc:AlternateContent>
       <p:sp>
         <p:nvSpPr>
           <p:cNvPr id="4" name="Datumsplatzhalter 3">
@@ -23143,7 +23488,7 @@
           <a:p>
             <a:fld id="{D5CE5686-0170-47AF-9B8A-7DF387E652FA}" type="datetime1">
               <a:rPr lang="en-GB" noProof="0" smtClean="0"/>
-              <a:t>24/07/2025</a:t>
+              <a:t>25/07/2025</a:t>
             </a:fld>
             <a:endParaRPr lang="en-GB" noProof="0" dirty="0"/>
           </a:p>
@@ -23299,12 +23644,19 @@
                 <a:pPr lvl="1"/>
                 <a:r>
                   <a:rPr lang="en-GB" dirty="0"/>
-                  <a:t>Use the deepest layer of the graph to find the tile that can be discarded in the </a:t>
+                  <a:t>Use the deepest layer of the graph to find the tile that can be discarded in the most scenarios</a:t>
                 </a:r>
-                <a:r>
-                  <a:rPr lang="en-GB"/>
-                  <a:t>most scenarios</a:t>
-                </a:r>
+              </a:p>
+              <a:p>
+                <a:pPr marL="266700" lvl="1" indent="0">
+                  <a:buNone/>
+                </a:pPr>
+                <a:endParaRPr lang="en-GB" dirty="0"/>
+              </a:p>
+              <a:p>
+                <a:pPr marL="266700" lvl="1" indent="0">
+                  <a:buNone/>
+                </a:pPr>
                 <a:endParaRPr lang="en-GB" dirty="0"/>
               </a:p>
               <a:p>
@@ -23319,7 +23671,15 @@
                 </a:pPr>
                 <a:r>
                   <a:rPr lang="en-GB" dirty="0"/>
-                  <a:t>Our goal is to…</a:t>
+                  <a:t>Our </a:t>
+                </a:r>
+                <a:r>
+                  <a:rPr lang="en-GB" b="1" dirty="0"/>
+                  <a:t>goal</a:t>
+                </a:r>
+                <a:r>
+                  <a:rPr lang="en-GB" dirty="0"/>
+                  <a:t> is to…</a:t>
                 </a:r>
               </a:p>
               <a:p>
@@ -23428,7 +23788,7 @@
           <a:p>
             <a:fld id="{D5CE5686-0170-47AF-9B8A-7DF387E652FA}" type="datetime1">
               <a:rPr lang="en-GB" noProof="0" smtClean="0"/>
-              <a:t>24/07/2025</a:t>
+              <a:t>25/07/2025</a:t>
             </a:fld>
             <a:endParaRPr lang="en-GB" noProof="0" dirty="0"/>
           </a:p>
@@ -23928,7 +24288,7 @@
           <a:p>
             <a:fld id="{D5CE5686-0170-47AF-9B8A-7DF387E652FA}" type="datetime1">
               <a:rPr lang="en-GB" noProof="0" smtClean="0"/>
-              <a:t>24/07/2025</a:t>
+              <a:t>25/07/2025</a:t>
             </a:fld>
             <a:endParaRPr lang="en-GB" noProof="0" dirty="0"/>
           </a:p>
@@ -24183,7 +24543,7 @@
           <a:p>
             <a:fld id="{C32F3C7F-0C5F-4A18-A13A-CAEFDEB56FA0}" type="datetime1">
               <a:rPr lang="en-GB" noProof="0" smtClean="0"/>
-              <a:t>24/07/2025</a:t>
+              <a:t>25/07/2025</a:t>
             </a:fld>
             <a:endParaRPr lang="en-GB" noProof="0" dirty="0"/>
           </a:p>
@@ -24400,7 +24760,15 @@
                 <a:pPr lvl="1"/>
                 <a:r>
                   <a:rPr lang="en-GB" dirty="0"/>
-                  <a:t>We then simulate drawing the tiles and calculate the </a:t>
+                  <a:t>We then </a:t>
+                </a:r>
+                <a:r>
+                  <a:rPr lang="en-GB" b="1" dirty="0"/>
+                  <a:t>simulate drawing the tiles </a:t>
+                </a:r>
+                <a:r>
+                  <a:rPr lang="en-GB" dirty="0"/>
+                  <a:t>and calculate the </a:t>
                 </a:r>
                 <a:r>
                   <a:rPr lang="en-GB" dirty="0" err="1"/>
@@ -24578,7 +24946,15 @@
                 <a:pPr lvl="2"/>
                 <a:r>
                   <a:rPr lang="en-GB" noProof="0" dirty="0"/>
-                  <a:t>We then generate all possible combinations of up to 5 groups and calculate </a:t>
+                  <a:t>We then </a:t>
+                </a:r>
+                <a:r>
+                  <a:rPr lang="en-GB" b="1" noProof="0" dirty="0"/>
+                  <a:t>generate all possible combinations</a:t>
+                </a:r>
+                <a:r>
+                  <a:rPr lang="en-GB" noProof="0" dirty="0"/>
+                  <a:t> of up to 5 groups and calculate </a:t>
                 </a:r>
                 <a14:m>
                   <m:oMath xmlns:m="http://schemas.openxmlformats.org/officeDocument/2006/math">
@@ -24941,7 +25317,7 @@
           <a:p>
             <a:fld id="{D5CE5686-0170-47AF-9B8A-7DF387E652FA}" type="datetime1">
               <a:rPr lang="en-GB" noProof="0" smtClean="0"/>
-              <a:t>24/07/2025</a:t>
+              <a:t>25/07/2025</a:t>
             </a:fld>
             <a:endParaRPr lang="en-GB" noProof="0" dirty="0"/>
           </a:p>
@@ -25185,7 +25561,7 @@
           <a:p>
             <a:fld id="{D5CE5686-0170-47AF-9B8A-7DF387E652FA}" type="datetime1">
               <a:rPr lang="en-GB" noProof="0" smtClean="0"/>
-              <a:t>24/07/2025</a:t>
+              <a:t>25/07/2025</a:t>
             </a:fld>
             <a:endParaRPr lang="en-GB" noProof="0" dirty="0"/>
           </a:p>

</xml_diff>

<commit_message>
small changes by Adil
</commit_message>
<xml_diff>
--- a/ProjectPresentation_asadikovic_jlyrer.pptx
+++ b/ProjectPresentation_asadikovic_jlyrer.pptx
@@ -4887,7 +4887,7 @@
           <a:p>
             <a:fld id="{F68ABEA4-9216-4FDF-AAE1-D8632908A8EC}" type="datetimeFigureOut">
               <a:rPr lang="de-CH" smtClean="0"/>
-              <a:t>25.07.2025</a:t>
+              <a:t>31.07.2025</a:t>
             </a:fld>
             <a:endParaRPr lang="de-CH"/>
           </a:p>
@@ -5064,7 +5064,7 @@
           <a:p>
             <a:fld id="{4B78A90D-FE7E-41AF-B03D-808D82937CB9}" type="datetimeFigureOut">
               <a:rPr lang="de-CH" smtClean="0"/>
-              <a:t>25.07.2025</a:t>
+              <a:t>31.07.2025</a:t>
             </a:fld>
             <a:endParaRPr lang="de-CH"/>
           </a:p>
@@ -5792,7 +5792,7 @@
           <a:p>
             <a:fld id="{C47C2547-0B26-4181-9958-0F74634B97A1}" type="datetime1">
               <a:rPr lang="de-CH" noProof="0" smtClean="0"/>
-              <a:t>25.07.2025</a:t>
+              <a:t>31.07.2025</a:t>
             </a:fld>
             <a:endParaRPr lang="de-CH" noProof="0"/>
           </a:p>
@@ -5987,7 +5987,7 @@
           <a:p>
             <a:fld id="{4A533879-9C0F-4F94-919F-30B833E8871A}" type="datetime1">
               <a:rPr lang="de-CH" noProof="0" smtClean="0"/>
-              <a:t>25.07.2025</a:t>
+              <a:t>31.07.2025</a:t>
             </a:fld>
             <a:endParaRPr lang="de-CH" noProof="0"/>
           </a:p>
@@ -6274,7 +6274,7 @@
           <a:p>
             <a:fld id="{68EF82BE-DF56-4719-B180-C3B0D509F71F}" type="datetime1">
               <a:rPr lang="de-CH" noProof="0" smtClean="0"/>
-              <a:t>25.07.2025</a:t>
+              <a:t>31.07.2025</a:t>
             </a:fld>
             <a:endParaRPr lang="de-CH" noProof="0"/>
           </a:p>
@@ -6572,7 +6572,7 @@
           <a:p>
             <a:fld id="{3E1B9425-7348-43E2-B0E9-6A2A48F5FA8A}" type="datetime1">
               <a:rPr lang="de-CH" noProof="0" smtClean="0"/>
-              <a:t>25.07.2025</a:t>
+              <a:t>31.07.2025</a:t>
             </a:fld>
             <a:endParaRPr lang="de-CH" noProof="0"/>
           </a:p>
@@ -6972,7 +6972,7 @@
           <a:p>
             <a:fld id="{0F7782B2-018B-4FD3-AD95-2F64EDE0E9D6}" type="datetime1">
               <a:rPr lang="de-CH" noProof="0" smtClean="0"/>
-              <a:t>25.07.2025</a:t>
+              <a:t>31.07.2025</a:t>
             </a:fld>
             <a:endParaRPr lang="de-CH" noProof="0"/>
           </a:p>
@@ -7340,7 +7340,7 @@
           <a:p>
             <a:fld id="{D0A0FED0-443D-411A-B8E4-0668A8890EE3}" type="datetime1">
               <a:rPr lang="de-CH" noProof="0" smtClean="0"/>
-              <a:t>25.07.2025</a:t>
+              <a:t>31.07.2025</a:t>
             </a:fld>
             <a:endParaRPr lang="de-CH" noProof="0"/>
           </a:p>
@@ -9369,7 +9369,7 @@
           <a:p>
             <a:fld id="{1332D50A-E6CC-4D88-8908-F2129032F4C7}" type="datetime1">
               <a:rPr lang="de-CH" noProof="0" smtClean="0"/>
-              <a:t>25.07.2025</a:t>
+              <a:t>31.07.2025</a:t>
             </a:fld>
             <a:endParaRPr lang="de-CH" noProof="0"/>
           </a:p>
@@ -9612,7 +9612,7 @@
           <a:p>
             <a:fld id="{11B96697-4585-4368-989A-16003D150648}" type="datetime1">
               <a:rPr lang="de-CH" noProof="0" smtClean="0"/>
-              <a:t>25.07.2025</a:t>
+              <a:t>31.07.2025</a:t>
             </a:fld>
             <a:endParaRPr lang="de-CH" noProof="0"/>
           </a:p>
@@ -9860,7 +9860,7 @@
           <a:p>
             <a:fld id="{3A01E762-278A-4155-9BEB-7C2CB2386E92}" type="datetime1">
               <a:rPr lang="de-CH" noProof="0" smtClean="0"/>
-              <a:t>25.07.2025</a:t>
+              <a:t>31.07.2025</a:t>
             </a:fld>
             <a:endParaRPr lang="de-CH" noProof="0"/>
           </a:p>
@@ -10136,7 +10136,7 @@
           <a:p>
             <a:fld id="{6C4EAFE7-317E-4912-B75C-DD6945F82242}" type="datetime1">
               <a:rPr lang="de-CH" noProof="0" smtClean="0"/>
-              <a:t>25.07.2025</a:t>
+              <a:t>31.07.2025</a:t>
             </a:fld>
             <a:endParaRPr lang="de-CH" noProof="0"/>
           </a:p>
@@ -12067,7 +12067,7 @@
           <a:p>
             <a:fld id="{4A358CF3-A22A-46C1-A4E5-5810212466EF}" type="datetime1">
               <a:rPr lang="de-CH" noProof="0" smtClean="0"/>
-              <a:t>25.07.2025</a:t>
+              <a:t>31.07.2025</a:t>
             </a:fld>
             <a:endParaRPr lang="de-CH" noProof="0"/>
           </a:p>
@@ -15403,7 +15403,7 @@
           <a:p>
             <a:fld id="{7260A9D5-8325-4620-96F6-FB312AC6FB66}" type="datetime1">
               <a:rPr lang="en-GB" noProof="0" smtClean="0"/>
-              <a:t>25/07/2025</a:t>
+              <a:t>31/07/2025</a:t>
             </a:fld>
             <a:endParaRPr lang="en-GB" noProof="0" dirty="0"/>
           </a:p>
@@ -18154,7 +18154,7 @@
           <a:p>
             <a:fld id="{7260A9D5-8325-4620-96F6-FB312AC6FB66}" type="datetime1">
               <a:rPr lang="en-GB" noProof="0" smtClean="0"/>
-              <a:t>25/07/2025</a:t>
+              <a:t>31/07/2025</a:t>
             </a:fld>
             <a:endParaRPr lang="en-GB" noProof="0" dirty="0"/>
           </a:p>
@@ -20913,7 +20913,7 @@
           <a:p>
             <a:fld id="{7260A9D5-8325-4620-96F6-FB312AC6FB66}" type="datetime1">
               <a:rPr lang="en-GB" noProof="0" smtClean="0"/>
-              <a:t>25/07/2025</a:t>
+              <a:t>31/07/2025</a:t>
             </a:fld>
             <a:endParaRPr lang="en-GB" noProof="0" dirty="0"/>
           </a:p>
@@ -21239,7 +21239,7 @@
           <a:p>
             <a:fld id="{3883C902-160B-4538-99A8-1486892643D4}" type="datetime1">
               <a:rPr lang="en-GB" noProof="0" smtClean="0"/>
-              <a:t>25/07/2025</a:t>
+              <a:t>31/07/2025</a:t>
             </a:fld>
             <a:endParaRPr lang="en-GB" noProof="0" dirty="0"/>
           </a:p>
@@ -21470,7 +21470,7 @@
           <a:p>
             <a:fld id="{3883C902-160B-4538-99A8-1486892643D4}" type="datetime1">
               <a:rPr lang="en-GB" noProof="0" smtClean="0"/>
-              <a:t>25/07/2025</a:t>
+              <a:t>31/07/2025</a:t>
             </a:fld>
             <a:endParaRPr lang="en-GB" noProof="0" dirty="0"/>
           </a:p>
@@ -21695,7 +21695,7 @@
           <a:p>
             <a:fld id="{C32F3C7F-0C5F-4A18-A13A-CAEFDEB56FA0}" type="datetime1">
               <a:rPr lang="en-GB" noProof="0" smtClean="0"/>
-              <a:t>25/07/2025</a:t>
+              <a:t>31/07/2025</a:t>
             </a:fld>
             <a:endParaRPr lang="en-GB" noProof="0" dirty="0"/>
           </a:p>
@@ -21955,7 +21955,7 @@
           <a:p>
             <a:fld id="{D5CE5686-0170-47AF-9B8A-7DF387E652FA}" type="datetime1">
               <a:rPr lang="en-GB" noProof="0" smtClean="0"/>
-              <a:t>25/07/2025</a:t>
+              <a:t>31/07/2025</a:t>
             </a:fld>
             <a:endParaRPr lang="en-GB" noProof="0" dirty="0"/>
           </a:p>
@@ -22151,7 +22151,7 @@
           <a:p>
             <a:fld id="{D5CE5686-0170-47AF-9B8A-7DF387E652FA}" type="datetime1">
               <a:rPr lang="en-GB" noProof="0" smtClean="0"/>
-              <a:t>25/07/2025</a:t>
+              <a:t>31/07/2025</a:t>
             </a:fld>
             <a:endParaRPr lang="en-GB" noProof="0" dirty="0"/>
           </a:p>
@@ -22379,7 +22379,7 @@
           <a:p>
             <a:fld id="{D5CE5686-0170-47AF-9B8A-7DF387E652FA}" type="datetime1">
               <a:rPr lang="en-GB" noProof="0" smtClean="0"/>
-              <a:t>25/07/2025</a:t>
+              <a:t>31/07/2025</a:t>
             </a:fld>
             <a:endParaRPr lang="en-GB" noProof="0" dirty="0"/>
           </a:p>
@@ -22960,7 +22960,7 @@
           <a:p>
             <a:fld id="{D5CE5686-0170-47AF-9B8A-7DF387E652FA}" type="datetime1">
               <a:rPr lang="en-GB" noProof="0" smtClean="0"/>
-              <a:t>25/07/2025</a:t>
+              <a:t>31/07/2025</a:t>
             </a:fld>
             <a:endParaRPr lang="en-GB" noProof="0" dirty="0"/>
           </a:p>
@@ -23060,8 +23060,8 @@
           </a:p>
         </p:txBody>
       </p:sp>
-      <mc:AlternateContent xmlns:mc="http://schemas.openxmlformats.org/markup-compatibility/2006">
-        <mc:Choice xmlns:a14="http://schemas.microsoft.com/office/drawing/2010/main" Requires="a14">
+      <mc:AlternateContent xmlns:mc="http://schemas.openxmlformats.org/markup-compatibility/2006" xmlns:a14="http://schemas.microsoft.com/office/drawing/2010/main">
+        <mc:Choice Requires="a14">
           <p:sp>
             <p:nvSpPr>
               <p:cNvPr id="3" name="Inhaltsplatzhalter 2">
@@ -23425,7 +23425,7 @@
             </p:txBody>
           </p:sp>
         </mc:Choice>
-        <mc:Fallback>
+        <mc:Fallback xmlns="">
           <p:sp>
             <p:nvSpPr>
               <p:cNvPr id="3" name="Inhaltsplatzhalter 2">
@@ -23488,7 +23488,7 @@
           <a:p>
             <a:fld id="{D5CE5686-0170-47AF-9B8A-7DF387E652FA}" type="datetime1">
               <a:rPr lang="en-GB" noProof="0" smtClean="0"/>
-              <a:t>25/07/2025</a:t>
+              <a:t>31/07/2025</a:t>
             </a:fld>
             <a:endParaRPr lang="en-GB" noProof="0" dirty="0"/>
           </a:p>
@@ -23588,8 +23588,8 @@
           </a:p>
         </p:txBody>
       </p:sp>
-      <mc:AlternateContent xmlns:mc="http://schemas.openxmlformats.org/markup-compatibility/2006">
-        <mc:Choice xmlns:a14="http://schemas.microsoft.com/office/drawing/2010/main" Requires="a14">
+      <mc:AlternateContent xmlns:mc="http://schemas.openxmlformats.org/markup-compatibility/2006" xmlns:a14="http://schemas.microsoft.com/office/drawing/2010/main">
+        <mc:Choice Requires="a14">
           <p:sp>
             <p:nvSpPr>
               <p:cNvPr id="3" name="Inhaltsplatzhalter 2">
@@ -23725,7 +23725,7 @@
             </p:txBody>
           </p:sp>
         </mc:Choice>
-        <mc:Fallback>
+        <mc:Fallback xmlns="">
           <p:sp>
             <p:nvSpPr>
               <p:cNvPr id="3" name="Inhaltsplatzhalter 2">
@@ -23788,7 +23788,7 @@
           <a:p>
             <a:fld id="{D5CE5686-0170-47AF-9B8A-7DF387E652FA}" type="datetime1">
               <a:rPr lang="en-GB" noProof="0" smtClean="0"/>
-              <a:t>25/07/2025</a:t>
+              <a:t>31/07/2025</a:t>
             </a:fld>
             <a:endParaRPr lang="en-GB" noProof="0" dirty="0"/>
           </a:p>
@@ -24288,7 +24288,7 @@
           <a:p>
             <a:fld id="{D5CE5686-0170-47AF-9B8A-7DF387E652FA}" type="datetime1">
               <a:rPr lang="en-GB" noProof="0" smtClean="0"/>
-              <a:t>25/07/2025</a:t>
+              <a:t>31/07/2025</a:t>
             </a:fld>
             <a:endParaRPr lang="en-GB" noProof="0" dirty="0"/>
           </a:p>
@@ -24543,7 +24543,7 @@
           <a:p>
             <a:fld id="{C32F3C7F-0C5F-4A18-A13A-CAEFDEB56FA0}" type="datetime1">
               <a:rPr lang="en-GB" noProof="0" smtClean="0"/>
-              <a:t>25/07/2025</a:t>
+              <a:t>31/07/2025</a:t>
             </a:fld>
             <a:endParaRPr lang="en-GB" noProof="0" dirty="0"/>
           </a:p>
@@ -25060,7 +25060,7 @@
                             <a:latin typeface="Cambria Math" panose="02040503050406030204" pitchFamily="18" charset="0"/>
                             <a:ea typeface="Cambria Math" panose="02040503050406030204" pitchFamily="18" charset="0"/>
                           </a:rPr>
-                          <m:t>∉ </m:t>
+                          <m:t>∉</m:t>
                         </m:r>
                         <m:nary>
                           <m:naryPr>
@@ -25101,6 +25101,20 @@
                           </m:sub>
                           <m:sup/>
                           <m:e>
+                            <m:r>
+                              <a:rPr lang="de-CH" b="0" i="1" noProof="0" smtClean="0">
+                                <a:latin typeface="Cambria Math" panose="02040503050406030204" pitchFamily="18" charset="0"/>
+                                <a:ea typeface="Cambria Math" panose="02040503050406030204" pitchFamily="18" charset="0"/>
+                              </a:rPr>
+                              <m:t>𝑠</m:t>
+                            </m:r>
+                            <m:r>
+                              <a:rPr lang="de-CH" b="0" i="1" noProof="0" smtClean="0">
+                                <a:latin typeface="Cambria Math" panose="02040503050406030204" pitchFamily="18" charset="0"/>
+                                <a:ea typeface="Cambria Math" panose="02040503050406030204" pitchFamily="18" charset="0"/>
+                              </a:rPr>
+                              <m:t>∩</m:t>
+                            </m:r>
                             <m:r>
                               <a:rPr lang="de-CH" b="0" i="1" noProof="0" smtClean="0">
                                 <a:latin typeface="Cambria Math" panose="02040503050406030204" pitchFamily="18" charset="0"/>
@@ -25275,7 +25289,7 @@
               <a:blipFill>
                 <a:blip r:embed="rId2"/>
                 <a:stretch>
-                  <a:fillRect l="-1307" t="-1695" r="-1648"/>
+                  <a:fillRect l="-1307" t="-1695" r="-1875"/>
                 </a:stretch>
               </a:blipFill>
             </p:spPr>
@@ -25317,7 +25331,7 @@
           <a:p>
             <a:fld id="{D5CE5686-0170-47AF-9B8A-7DF387E652FA}" type="datetime1">
               <a:rPr lang="en-GB" noProof="0" smtClean="0"/>
-              <a:t>25/07/2025</a:t>
+              <a:t>31/07/2025</a:t>
             </a:fld>
             <a:endParaRPr lang="en-GB" noProof="0" dirty="0"/>
           </a:p>
@@ -25561,7 +25575,7 @@
           <a:p>
             <a:fld id="{D5CE5686-0170-47AF-9B8A-7DF387E652FA}" type="datetime1">
               <a:rPr lang="en-GB" noProof="0" smtClean="0"/>
-              <a:t>25/07/2025</a:t>
+              <a:t>31/07/2025</a:t>
             </a:fld>
             <a:endParaRPr lang="en-GB" noProof="0" dirty="0"/>
           </a:p>

</xml_diff>